<commit_message>
Touched up the Exercise 1 with feedback from dry run.
</commit_message>
<xml_diff>
--- a/Hands-OnSession/Content/SOM Hands-On Exercise 1.pptx
+++ b/Hands-OnSession/Content/SOM Hands-On Exercise 1.pptx
@@ -127,7 +127,7 @@
   </p:defaultTextStyle>
   <p:extLst>
     <p:ext uri="{EFAFB233-063F-42B5-8137-9DF3F51BA10A}">
-      <p15:sldGuideLst xmlns:p15="http://schemas.microsoft.com/office/powerpoint/2012/main" xmlns=""/>
+      <p15:sldGuideLst xmlns="" xmlns:p15="http://schemas.microsoft.com/office/powerpoint/2012/main"/>
     </p:ext>
   </p:extLst>
 </p:presentation>
@@ -265,7 +265,7 @@
             <a:fld id="{7E25EC0B-754B-4A80-883F-145E4B31EADE}" type="datetimeFigureOut">
               <a:rPr lang="en-US" smtClean="0"/>
               <a:pPr/>
-              <a:t>7/22/2015</a:t>
+              <a:t>7/29/2015</a:t>
             </a:fld>
             <a:endParaRPr lang="en-US"/>
           </a:p>
@@ -317,7 +317,7 @@
     </p:spTree>
     <p:extLst>
       <p:ext uri="{BB962C8B-B14F-4D97-AF65-F5344CB8AC3E}">
-        <p14:creationId xmlns:p14="http://schemas.microsoft.com/office/powerpoint/2010/main" xmlns="" val="3136077572"/>
+        <p14:creationId xmlns="" xmlns:p14="http://schemas.microsoft.com/office/powerpoint/2010/main" val="3136077572"/>
       </p:ext>
     </p:extLst>
   </p:cSld>
@@ -437,7 +437,7 @@
             <a:fld id="{7E25EC0B-754B-4A80-883F-145E4B31EADE}" type="datetimeFigureOut">
               <a:rPr lang="en-US" smtClean="0"/>
               <a:pPr/>
-              <a:t>7/22/2015</a:t>
+              <a:t>7/29/2015</a:t>
             </a:fld>
             <a:endParaRPr lang="en-US"/>
           </a:p>
@@ -489,7 +489,7 @@
     </p:spTree>
     <p:extLst>
       <p:ext uri="{BB962C8B-B14F-4D97-AF65-F5344CB8AC3E}">
-        <p14:creationId xmlns:p14="http://schemas.microsoft.com/office/powerpoint/2010/main" xmlns="" val="607129383"/>
+        <p14:creationId xmlns="" xmlns:p14="http://schemas.microsoft.com/office/powerpoint/2010/main" val="607129383"/>
       </p:ext>
     </p:extLst>
   </p:cSld>
@@ -619,7 +619,7 @@
             <a:fld id="{7E25EC0B-754B-4A80-883F-145E4B31EADE}" type="datetimeFigureOut">
               <a:rPr lang="en-US" smtClean="0"/>
               <a:pPr/>
-              <a:t>7/22/2015</a:t>
+              <a:t>7/29/2015</a:t>
             </a:fld>
             <a:endParaRPr lang="en-US"/>
           </a:p>
@@ -671,7 +671,7 @@
     </p:spTree>
     <p:extLst>
       <p:ext uri="{BB962C8B-B14F-4D97-AF65-F5344CB8AC3E}">
-        <p14:creationId xmlns:p14="http://schemas.microsoft.com/office/powerpoint/2010/main" xmlns="" val="1111243704"/>
+        <p14:creationId xmlns="" xmlns:p14="http://schemas.microsoft.com/office/powerpoint/2010/main" val="1111243704"/>
       </p:ext>
     </p:extLst>
   </p:cSld>
@@ -791,7 +791,7 @@
             <a:fld id="{7E25EC0B-754B-4A80-883F-145E4B31EADE}" type="datetimeFigureOut">
               <a:rPr lang="en-US" smtClean="0"/>
               <a:pPr/>
-              <a:t>7/22/2015</a:t>
+              <a:t>7/29/2015</a:t>
             </a:fld>
             <a:endParaRPr lang="en-US"/>
           </a:p>
@@ -843,7 +843,7 @@
     </p:spTree>
     <p:extLst>
       <p:ext uri="{BB962C8B-B14F-4D97-AF65-F5344CB8AC3E}">
-        <p14:creationId xmlns:p14="http://schemas.microsoft.com/office/powerpoint/2010/main" xmlns="" val="3643408091"/>
+        <p14:creationId xmlns="" xmlns:p14="http://schemas.microsoft.com/office/powerpoint/2010/main" val="3643408091"/>
       </p:ext>
     </p:extLst>
   </p:cSld>
@@ -1039,7 +1039,7 @@
             <a:fld id="{7E25EC0B-754B-4A80-883F-145E4B31EADE}" type="datetimeFigureOut">
               <a:rPr lang="en-US" smtClean="0"/>
               <a:pPr/>
-              <a:t>7/22/2015</a:t>
+              <a:t>7/29/2015</a:t>
             </a:fld>
             <a:endParaRPr lang="en-US"/>
           </a:p>
@@ -1091,7 +1091,7 @@
     </p:spTree>
     <p:extLst>
       <p:ext uri="{BB962C8B-B14F-4D97-AF65-F5344CB8AC3E}">
-        <p14:creationId xmlns:p14="http://schemas.microsoft.com/office/powerpoint/2010/main" xmlns="" val="3877002720"/>
+        <p14:creationId xmlns="" xmlns:p14="http://schemas.microsoft.com/office/powerpoint/2010/main" val="3877002720"/>
       </p:ext>
     </p:extLst>
   </p:cSld>
@@ -1273,7 +1273,7 @@
             <a:fld id="{7E25EC0B-754B-4A80-883F-145E4B31EADE}" type="datetimeFigureOut">
               <a:rPr lang="en-US" smtClean="0"/>
               <a:pPr/>
-              <a:t>7/22/2015</a:t>
+              <a:t>7/29/2015</a:t>
             </a:fld>
             <a:endParaRPr lang="en-US"/>
           </a:p>
@@ -1325,7 +1325,7 @@
     </p:spTree>
     <p:extLst>
       <p:ext uri="{BB962C8B-B14F-4D97-AF65-F5344CB8AC3E}">
-        <p14:creationId xmlns:p14="http://schemas.microsoft.com/office/powerpoint/2010/main" xmlns="" val="3968856589"/>
+        <p14:creationId xmlns="" xmlns:p14="http://schemas.microsoft.com/office/powerpoint/2010/main" val="3968856589"/>
       </p:ext>
     </p:extLst>
   </p:cSld>
@@ -1642,7 +1642,7 @@
             <a:fld id="{7E25EC0B-754B-4A80-883F-145E4B31EADE}" type="datetimeFigureOut">
               <a:rPr lang="en-US" smtClean="0"/>
               <a:pPr/>
-              <a:t>7/22/2015</a:t>
+              <a:t>7/29/2015</a:t>
             </a:fld>
             <a:endParaRPr lang="en-US"/>
           </a:p>
@@ -1694,7 +1694,7 @@
     </p:spTree>
     <p:extLst>
       <p:ext uri="{BB962C8B-B14F-4D97-AF65-F5344CB8AC3E}">
-        <p14:creationId xmlns:p14="http://schemas.microsoft.com/office/powerpoint/2010/main" xmlns="" val="830376763"/>
+        <p14:creationId xmlns="" xmlns:p14="http://schemas.microsoft.com/office/powerpoint/2010/main" val="830376763"/>
       </p:ext>
     </p:extLst>
   </p:cSld>
@@ -1762,7 +1762,7 @@
             <a:fld id="{7E25EC0B-754B-4A80-883F-145E4B31EADE}" type="datetimeFigureOut">
               <a:rPr lang="en-US" smtClean="0"/>
               <a:pPr/>
-              <a:t>7/22/2015</a:t>
+              <a:t>7/29/2015</a:t>
             </a:fld>
             <a:endParaRPr lang="en-US"/>
           </a:p>
@@ -1814,7 +1814,7 @@
     </p:spTree>
     <p:extLst>
       <p:ext uri="{BB962C8B-B14F-4D97-AF65-F5344CB8AC3E}">
-        <p14:creationId xmlns:p14="http://schemas.microsoft.com/office/powerpoint/2010/main" xmlns="" val="2026636009"/>
+        <p14:creationId xmlns="" xmlns:p14="http://schemas.microsoft.com/office/powerpoint/2010/main" val="2026636009"/>
       </p:ext>
     </p:extLst>
   </p:cSld>
@@ -1859,7 +1859,7 @@
             <a:fld id="{7E25EC0B-754B-4A80-883F-145E4B31EADE}" type="datetimeFigureOut">
               <a:rPr lang="en-US" smtClean="0"/>
               <a:pPr/>
-              <a:t>7/22/2015</a:t>
+              <a:t>7/29/2015</a:t>
             </a:fld>
             <a:endParaRPr lang="en-US"/>
           </a:p>
@@ -1911,7 +1911,7 @@
     </p:spTree>
     <p:extLst>
       <p:ext uri="{BB962C8B-B14F-4D97-AF65-F5344CB8AC3E}">
-        <p14:creationId xmlns:p14="http://schemas.microsoft.com/office/powerpoint/2010/main" xmlns="" val="2409136269"/>
+        <p14:creationId xmlns="" xmlns:p14="http://schemas.microsoft.com/office/powerpoint/2010/main" val="2409136269"/>
       </p:ext>
     </p:extLst>
   </p:cSld>
@@ -2138,7 +2138,7 @@
             <a:fld id="{7E25EC0B-754B-4A80-883F-145E4B31EADE}" type="datetimeFigureOut">
               <a:rPr lang="en-US" smtClean="0"/>
               <a:pPr/>
-              <a:t>7/22/2015</a:t>
+              <a:t>7/29/2015</a:t>
             </a:fld>
             <a:endParaRPr lang="en-US"/>
           </a:p>
@@ -2190,7 +2190,7 @@
     </p:spTree>
     <p:extLst>
       <p:ext uri="{BB962C8B-B14F-4D97-AF65-F5344CB8AC3E}">
-        <p14:creationId xmlns:p14="http://schemas.microsoft.com/office/powerpoint/2010/main" xmlns="" val="3936578497"/>
+        <p14:creationId xmlns="" xmlns:p14="http://schemas.microsoft.com/office/powerpoint/2010/main" val="3936578497"/>
       </p:ext>
     </p:extLst>
   </p:cSld>
@@ -2393,7 +2393,7 @@
             <a:fld id="{7E25EC0B-754B-4A80-883F-145E4B31EADE}" type="datetimeFigureOut">
               <a:rPr lang="en-US" smtClean="0"/>
               <a:pPr/>
-              <a:t>7/22/2015</a:t>
+              <a:t>7/29/2015</a:t>
             </a:fld>
             <a:endParaRPr lang="en-US"/>
           </a:p>
@@ -2445,7 +2445,7 @@
     </p:spTree>
     <p:extLst>
       <p:ext uri="{BB962C8B-B14F-4D97-AF65-F5344CB8AC3E}">
-        <p14:creationId xmlns:p14="http://schemas.microsoft.com/office/powerpoint/2010/main" xmlns="" val="1542778836"/>
+        <p14:creationId xmlns="" xmlns:p14="http://schemas.microsoft.com/office/powerpoint/2010/main" val="1542778836"/>
       </p:ext>
     </p:extLst>
   </p:cSld>
@@ -2608,7 +2608,7 @@
             <a:fld id="{7E25EC0B-754B-4A80-883F-145E4B31EADE}" type="datetimeFigureOut">
               <a:rPr lang="en-US" smtClean="0"/>
               <a:pPr/>
-              <a:t>7/22/2015</a:t>
+              <a:t>7/29/2015</a:t>
             </a:fld>
             <a:endParaRPr lang="en-US"/>
           </a:p>
@@ -2696,7 +2696,7 @@
     </p:spTree>
     <p:extLst>
       <p:ext uri="{BB962C8B-B14F-4D97-AF65-F5344CB8AC3E}">
-        <p14:creationId xmlns:p14="http://schemas.microsoft.com/office/powerpoint/2010/main" xmlns="" val="1866208585"/>
+        <p14:creationId xmlns="" xmlns:p14="http://schemas.microsoft.com/office/powerpoint/2010/main" val="1866208585"/>
       </p:ext>
     </p:extLst>
   </p:cSld>
@@ -3063,7 +3063,7 @@
     </p:spTree>
     <p:extLst>
       <p:ext uri="{BB962C8B-B14F-4D97-AF65-F5344CB8AC3E}">
-        <p14:creationId xmlns:p14="http://schemas.microsoft.com/office/powerpoint/2010/main" xmlns="" val="167897482"/>
+        <p14:creationId xmlns="" xmlns:p14="http://schemas.microsoft.com/office/powerpoint/2010/main" val="167897482"/>
       </p:ext>
     </p:extLst>
   </p:cSld>
@@ -3291,7 +3291,7 @@
     </p:spTree>
     <p:extLst>
       <p:ext uri="{BB962C8B-B14F-4D97-AF65-F5344CB8AC3E}">
-        <p14:creationId xmlns:p14="http://schemas.microsoft.com/office/powerpoint/2010/main" xmlns="" val="2925144874"/>
+        <p14:creationId xmlns="" xmlns:p14="http://schemas.microsoft.com/office/powerpoint/2010/main" val="2925144874"/>
       </p:ext>
     </p:extLst>
   </p:cSld>
@@ -3517,9 +3517,27 @@
             </a:pPr>
             <a:r>
               <a:rPr lang="en-US" dirty="0" smtClean="0"/>
-              <a:t>There are multiple CS lines available in the SPI API, but for this exercise only one CS line is required. The I/O resource chosen for MOSI and CS 1-5 will not be used.</a:t>
-            </a:r>
-            <a:endParaRPr lang="en-US" sz="3600" b="1" dirty="0" smtClean="0"/>
+              <a:t>There are multiple CS lines available in the SPI API, but for this exercise only one CS line is required. The I/O resource chosen for MOSI and CS 1-5 will </a:t>
+            </a:r>
+            <a:r>
+              <a:rPr lang="en-US" b="1" dirty="0" smtClean="0"/>
+              <a:t>not be used</a:t>
+            </a:r>
+            <a:r>
+              <a:rPr lang="en-US" dirty="0" smtClean="0"/>
+              <a:t>.</a:t>
+            </a:r>
+          </a:p>
+          <a:p>
+            <a:pPr marL="342900" indent="-342900">
+              <a:buFont typeface="+mj-lt"/>
+              <a:buAutoNum type="arabicPeriod"/>
+            </a:pPr>
+            <a:r>
+              <a:rPr lang="en-US" dirty="0" smtClean="0"/>
+              <a:t>Ensure the cluster matches the completed cluster to the left.</a:t>
+            </a:r>
+            <a:endParaRPr lang="en-US" dirty="0" smtClean="0"/>
           </a:p>
         </p:txBody>
       </p:sp>
@@ -3601,7 +3619,7 @@
         </p:blipFill>
         <p:spPr>
           <a:xfrm>
-            <a:off x="3724768" y="1227436"/>
+            <a:off x="3675341" y="378939"/>
             <a:ext cx="2560527" cy="2005746"/>
           </a:xfrm>
           <a:prstGeom prst="rect">
@@ -3625,7 +3643,7 @@
         </p:blipFill>
         <p:spPr>
           <a:xfrm>
-            <a:off x="635920" y="1219215"/>
+            <a:off x="586488" y="362480"/>
             <a:ext cx="2817623" cy="1503005"/>
           </a:xfrm>
           <a:prstGeom prst="rect">
@@ -3641,7 +3659,7 @@
         </p:nvSpPr>
         <p:spPr>
           <a:xfrm>
-            <a:off x="1869995" y="2825595"/>
+            <a:off x="1762903" y="1985336"/>
             <a:ext cx="288324" cy="650789"/>
           </a:xfrm>
           <a:prstGeom prst="downArrow">
@@ -3689,7 +3707,7 @@
         </p:blipFill>
         <p:spPr>
           <a:xfrm>
-            <a:off x="428373" y="3690567"/>
+            <a:off x="296567" y="2759691"/>
             <a:ext cx="3670671" cy="1842235"/>
           </a:xfrm>
           <a:prstGeom prst="rect">
@@ -3697,10 +3715,78 @@
           </a:prstGeom>
         </p:spPr>
       </p:pic>
+      <p:pic>
+        <p:nvPicPr>
+          <p:cNvPr id="13" name="Picture 12" descr="SPI DIO Lines Complete.png"/>
+          <p:cNvPicPr>
+            <a:picLocks noChangeAspect="1"/>
+          </p:cNvPicPr>
+          <p:nvPr/>
+        </p:nvPicPr>
+        <p:blipFill>
+          <a:blip r:embed="rId5" cstate="print"/>
+          <a:stretch>
+            <a:fillRect/>
+          </a:stretch>
+        </p:blipFill>
+        <p:spPr>
+          <a:xfrm>
+            <a:off x="4275541" y="4868562"/>
+            <a:ext cx="1791971" cy="1573818"/>
+          </a:xfrm>
+          <a:prstGeom prst="rect">
+            <a:avLst/>
+          </a:prstGeom>
+        </p:spPr>
+      </p:pic>
+      <p:sp>
+        <p:nvSpPr>
+          <p:cNvPr id="15" name="Bent-Up Arrow 14"/>
+          <p:cNvSpPr/>
+          <p:nvPr/>
+        </p:nvSpPr>
+        <p:spPr>
+          <a:xfrm rot="5400000">
+            <a:off x="2129482" y="4238375"/>
+            <a:ext cx="1515759" cy="2133600"/>
+          </a:xfrm>
+          <a:prstGeom prst="bentUpArrow">
+            <a:avLst>
+              <a:gd name="adj1" fmla="val 10480"/>
+              <a:gd name="adj2" fmla="val 11770"/>
+              <a:gd name="adj3" fmla="val 14502"/>
+            </a:avLst>
+          </a:prstGeom>
+        </p:spPr>
+        <p:style>
+          <a:lnRef idx="2">
+            <a:schemeClr val="accent1">
+              <a:shade val="50000"/>
+            </a:schemeClr>
+          </a:lnRef>
+          <a:fillRef idx="1">
+            <a:schemeClr val="accent1"/>
+          </a:fillRef>
+          <a:effectRef idx="0">
+            <a:schemeClr val="accent1"/>
+          </a:effectRef>
+          <a:fontRef idx="minor">
+            <a:schemeClr val="lt1"/>
+          </a:fontRef>
+        </p:style>
+        <p:txBody>
+          <a:bodyPr rtlCol="0" anchor="ctr"/>
+          <a:lstStyle/>
+          <a:p>
+            <a:pPr algn="ctr"/>
+            <a:endParaRPr lang="en-US"/>
+          </a:p>
+        </p:txBody>
+      </p:sp>
     </p:spTree>
     <p:extLst>
       <p:ext uri="{BB962C8B-B14F-4D97-AF65-F5344CB8AC3E}">
-        <p14:creationId xmlns:p14="http://schemas.microsoft.com/office/powerpoint/2010/main" xmlns="" val="2925144874"/>
+        <p14:creationId xmlns="" xmlns:p14="http://schemas.microsoft.com/office/powerpoint/2010/main" val="2925144874"/>
       </p:ext>
     </p:extLst>
   </p:cSld>
@@ -4072,7 +4158,7 @@
       </p:sp>
       <p:pic>
         <p:nvPicPr>
-          <p:cNvPr id="15" name="Picture 14" descr="enable Selection.png"/>
+          <p:cNvPr id="7" name="Picture 6" descr="enable Selection.png"/>
           <p:cNvPicPr>
             <a:picLocks noChangeAspect="1"/>
           </p:cNvPicPr>
@@ -4086,8 +4172,8 @@
         </p:blipFill>
         <p:spPr>
           <a:xfrm>
-            <a:off x="1122773" y="531866"/>
-            <a:ext cx="4198869" cy="1844749"/>
+            <a:off x="1214446" y="431988"/>
+            <a:ext cx="4296668" cy="1741281"/>
           </a:xfrm>
           <a:prstGeom prst="rect">
             <a:avLst/>
@@ -4096,7 +4182,7 @@
       </p:pic>
       <p:pic>
         <p:nvPicPr>
-          <p:cNvPr id="16" name="Picture 15" descr="Enable States.png"/>
+          <p:cNvPr id="8" name="Picture 7" descr="Enable States.png"/>
           <p:cNvPicPr>
             <a:picLocks noChangeAspect="1"/>
           </p:cNvPicPr>
@@ -4110,18 +4196,58 @@
         </p:blipFill>
         <p:spPr>
           <a:xfrm>
-            <a:off x="2181252" y="2792626"/>
-            <a:ext cx="2363174" cy="3069410"/>
+            <a:off x="2190776" y="3199865"/>
+            <a:ext cx="2471839" cy="3307692"/>
           </a:xfrm>
           <a:prstGeom prst="rect">
             <a:avLst/>
           </a:prstGeom>
         </p:spPr>
       </p:pic>
+      <p:sp>
+        <p:nvSpPr>
+          <p:cNvPr id="9" name="Down Arrow 8"/>
+          <p:cNvSpPr/>
+          <p:nvPr/>
+        </p:nvSpPr>
+        <p:spPr>
+          <a:xfrm>
+            <a:off x="3080951" y="2356021"/>
+            <a:ext cx="263611" cy="807308"/>
+          </a:xfrm>
+          <a:prstGeom prst="downArrow">
+            <a:avLst/>
+          </a:prstGeom>
+        </p:spPr>
+        <p:style>
+          <a:lnRef idx="2">
+            <a:schemeClr val="accent1">
+              <a:shade val="50000"/>
+            </a:schemeClr>
+          </a:lnRef>
+          <a:fillRef idx="1">
+            <a:schemeClr val="accent1"/>
+          </a:fillRef>
+          <a:effectRef idx="0">
+            <a:schemeClr val="accent1"/>
+          </a:effectRef>
+          <a:fontRef idx="minor">
+            <a:schemeClr val="lt1"/>
+          </a:fontRef>
+        </p:style>
+        <p:txBody>
+          <a:bodyPr rtlCol="0" anchor="ctr"/>
+          <a:lstStyle/>
+          <a:p>
+            <a:pPr algn="ctr"/>
+            <a:endParaRPr lang="en-US"/>
+          </a:p>
+        </p:txBody>
+      </p:sp>
     </p:spTree>
     <p:extLst>
       <p:ext uri="{BB962C8B-B14F-4D97-AF65-F5344CB8AC3E}">
-        <p14:creationId xmlns:p14="http://schemas.microsoft.com/office/powerpoint/2010/main" xmlns="" val="2925144874"/>
+        <p14:creationId xmlns="" xmlns:p14="http://schemas.microsoft.com/office/powerpoint/2010/main" val="2925144874"/>
       </p:ext>
     </p:extLst>
   </p:cSld>
@@ -4807,7 +4933,7 @@
     </p:spTree>
     <p:extLst>
       <p:ext uri="{BB962C8B-B14F-4D97-AF65-F5344CB8AC3E}">
-        <p14:creationId xmlns:p14="http://schemas.microsoft.com/office/powerpoint/2010/main" xmlns="" val="2925144874"/>
+        <p14:creationId xmlns="" xmlns:p14="http://schemas.microsoft.com/office/powerpoint/2010/main" val="2925144874"/>
       </p:ext>
     </p:extLst>
   </p:cSld>
@@ -5607,7 +5733,7 @@
     </p:spTree>
     <p:extLst>
       <p:ext uri="{BB962C8B-B14F-4D97-AF65-F5344CB8AC3E}">
-        <p14:creationId xmlns:p14="http://schemas.microsoft.com/office/powerpoint/2010/main" xmlns="" val="2925144874"/>
+        <p14:creationId xmlns="" xmlns:p14="http://schemas.microsoft.com/office/powerpoint/2010/main" val="2925144874"/>
       </p:ext>
     </p:extLst>
   </p:cSld>
@@ -5744,7 +5870,7 @@
       </p:sp>
       <p:pic>
         <p:nvPicPr>
-          <p:cNvPr id="20" name="Picture 19" descr="Completed Code.png"/>
+          <p:cNvPr id="7" name="Picture 6" descr="Completed Code.png"/>
           <p:cNvPicPr>
             <a:picLocks noChangeAspect="1"/>
           </p:cNvPicPr>
@@ -5758,8 +5884,8 @@
         </p:blipFill>
         <p:spPr>
           <a:xfrm>
-            <a:off x="16476" y="1318053"/>
-            <a:ext cx="6684934" cy="3822357"/>
+            <a:off x="32952" y="1474568"/>
+            <a:ext cx="6659376" cy="3793525"/>
           </a:xfrm>
           <a:prstGeom prst="rect">
             <a:avLst/>
@@ -5769,7 +5895,7 @@
     </p:spTree>
     <p:extLst>
       <p:ext uri="{BB962C8B-B14F-4D97-AF65-F5344CB8AC3E}">
-        <p14:creationId xmlns:p14="http://schemas.microsoft.com/office/powerpoint/2010/main" xmlns="" val="2925144874"/>
+        <p14:creationId xmlns="" xmlns:p14="http://schemas.microsoft.com/office/powerpoint/2010/main" val="2925144874"/>
       </p:ext>
     </p:extLst>
   </p:cSld>
@@ -6141,7 +6267,7 @@
     </p:spTree>
     <p:extLst>
       <p:ext uri="{BB962C8B-B14F-4D97-AF65-F5344CB8AC3E}">
-        <p14:creationId xmlns:p14="http://schemas.microsoft.com/office/powerpoint/2010/main" xmlns="" val="2925144874"/>
+        <p14:creationId xmlns="" xmlns:p14="http://schemas.microsoft.com/office/powerpoint/2010/main" val="2925144874"/>
       </p:ext>
     </p:extLst>
   </p:cSld>
@@ -6480,7 +6606,7 @@
     </p:spTree>
     <p:extLst>
       <p:ext uri="{BB962C8B-B14F-4D97-AF65-F5344CB8AC3E}">
-        <p14:creationId xmlns:p14="http://schemas.microsoft.com/office/powerpoint/2010/main" xmlns="" val="2925144874"/>
+        <p14:creationId xmlns="" xmlns:p14="http://schemas.microsoft.com/office/powerpoint/2010/main" val="2925144874"/>
       </p:ext>
     </p:extLst>
   </p:cSld>
@@ -6936,7 +7062,7 @@
     </p:spTree>
     <p:extLst>
       <p:ext uri="{BB962C8B-B14F-4D97-AF65-F5344CB8AC3E}">
-        <p14:creationId xmlns:p14="http://schemas.microsoft.com/office/powerpoint/2010/main" xmlns="" val="2925144874"/>
+        <p14:creationId xmlns="" xmlns:p14="http://schemas.microsoft.com/office/powerpoint/2010/main" val="2925144874"/>
       </p:ext>
     </p:extLst>
   </p:cSld>
@@ -7412,7 +7538,7 @@
     </p:spTree>
     <p:extLst>
       <p:ext uri="{BB962C8B-B14F-4D97-AF65-F5344CB8AC3E}">
-        <p14:creationId xmlns:p14="http://schemas.microsoft.com/office/powerpoint/2010/main" xmlns="" val="2925144874"/>
+        <p14:creationId xmlns="" xmlns:p14="http://schemas.microsoft.com/office/powerpoint/2010/main" val="2925144874"/>
       </p:ext>
     </p:extLst>
   </p:cSld>
@@ -7600,7 +7726,7 @@
     </p:spTree>
     <p:extLst>
       <p:ext uri="{BB962C8B-B14F-4D97-AF65-F5344CB8AC3E}">
-        <p14:creationId xmlns:p14="http://schemas.microsoft.com/office/powerpoint/2010/main" xmlns="" val="2925144874"/>
+        <p14:creationId xmlns="" xmlns:p14="http://schemas.microsoft.com/office/powerpoint/2010/main" val="2925144874"/>
       </p:ext>
     </p:extLst>
   </p:cSld>
@@ -7669,11 +7795,7 @@
             </a:r>
             <a:r>
               <a:rPr lang="en-US" dirty="0" smtClean="0"/>
-              <a:t> as shown</a:t>
-            </a:r>
-            <a:r>
-              <a:rPr lang="en-US" dirty="0" smtClean="0"/>
-              <a:t>.</a:t>
+              <a:t> as shown.</a:t>
             </a:r>
           </a:p>
           <a:p>
@@ -7695,7 +7817,6 @@
               <a:rPr lang="en-US" dirty="0" smtClean="0"/>
               <a:t>The remaining code formats and plots the data on a digital chart, and also makes period and frequency measurements on the data to validate the timing.</a:t>
             </a:r>
-            <a:endParaRPr lang="en-US" dirty="0" smtClean="0"/>
           </a:p>
           <a:p>
             <a:pPr marL="457200" indent="-457200">
@@ -7825,7 +7946,7 @@
     </p:spTree>
     <p:extLst>
       <p:ext uri="{BB962C8B-B14F-4D97-AF65-F5344CB8AC3E}">
-        <p14:creationId xmlns:p14="http://schemas.microsoft.com/office/powerpoint/2010/main" xmlns="" val="2925144874"/>
+        <p14:creationId xmlns="" xmlns:p14="http://schemas.microsoft.com/office/powerpoint/2010/main" val="2925144874"/>
       </p:ext>
     </p:extLst>
   </p:cSld>
@@ -7893,11 +8014,7 @@
             </a:pPr>
             <a:r>
               <a:rPr lang="en-US" dirty="0" smtClean="0"/>
-              <a:t>Switch back to the front panel, and run the VI</a:t>
-            </a:r>
-            <a:r>
-              <a:rPr lang="en-US" dirty="0" smtClean="0"/>
-              <a:t>.</a:t>
+              <a:t>Switch back to the front panel, and run the VI.</a:t>
             </a:r>
           </a:p>
           <a:p>
@@ -7983,13 +8100,8 @@
             </a:r>
             <a:r>
               <a:rPr lang="en-US" dirty="0" smtClean="0"/>
-              <a:t> control and observe the change in the SPI message’s characteristics</a:t>
-            </a:r>
-            <a:r>
-              <a:rPr lang="en-US" dirty="0" smtClean="0"/>
-              <a:t>.</a:t>
-            </a:r>
-            <a:endParaRPr lang="en-US" dirty="0" smtClean="0"/>
+              <a:t> control and observe the change in the SPI message’s characteristics.</a:t>
+            </a:r>
           </a:p>
           <a:p>
             <a:pPr marL="457200" indent="-457200">
@@ -8070,7 +8182,6 @@
               <a:rPr lang="en-US" dirty="0" smtClean="0"/>
               <a:t>.</a:t>
             </a:r>
-            <a:endParaRPr lang="en-US" dirty="0" smtClean="0"/>
           </a:p>
           <a:p>
             <a:pPr marL="457200" indent="-457200">
@@ -8184,7 +8295,7 @@
     </p:spTree>
     <p:extLst>
       <p:ext uri="{BB962C8B-B14F-4D97-AF65-F5344CB8AC3E}">
-        <p14:creationId xmlns:p14="http://schemas.microsoft.com/office/powerpoint/2010/main" xmlns="" val="2925144874"/>
+        <p14:creationId xmlns="" xmlns:p14="http://schemas.microsoft.com/office/powerpoint/2010/main" val="2925144874"/>
       </p:ext>
     </p:extLst>
   </p:cSld>
@@ -8242,13 +8353,8 @@
           <a:p>
             <a:r>
               <a:rPr lang="en-US" sz="2400" b="1" dirty="0" smtClean="0"/>
-              <a:t>PART </a:t>
-            </a:r>
-            <a:r>
-              <a:rPr lang="en-US" sz="2400" b="1" dirty="0" smtClean="0"/>
-              <a:t>D – Run the FPGA</a:t>
-            </a:r>
-            <a:endParaRPr lang="en-US" sz="2400" b="1" dirty="0" smtClean="0"/>
+              <a:t>PART D – Run the FPGA</a:t>
+            </a:r>
           </a:p>
           <a:p>
             <a:pPr marL="457200" indent="-457200">
@@ -8341,11 +8447,7 @@
             </a:r>
             <a:r>
               <a:rPr lang="en-US" b="1" dirty="0" smtClean="0"/>
-              <a:t>Not </a:t>
-            </a:r>
-            <a:r>
-              <a:rPr lang="en-US" b="1" dirty="0" smtClean="0"/>
-              <a:t>used</a:t>
+              <a:t>Not used</a:t>
             </a:r>
             <a:endParaRPr lang="en-US" dirty="0" smtClean="0"/>
           </a:p>
@@ -8358,7 +8460,6 @@
               <a:rPr lang="en-US" dirty="0" smtClean="0"/>
               <a:t>Valid data should appear on the Rx chart. Make sounds near the PmodMIC3 to see if the chart reflects the change.</a:t>
             </a:r>
-            <a:endParaRPr lang="en-US" dirty="0" smtClean="0"/>
           </a:p>
           <a:p>
             <a:pPr marL="457200" indent="-457200">
@@ -8472,7 +8573,7 @@
     </p:spTree>
     <p:extLst>
       <p:ext uri="{BB962C8B-B14F-4D97-AF65-F5344CB8AC3E}">
-        <p14:creationId xmlns:p14="http://schemas.microsoft.com/office/powerpoint/2010/main" xmlns="" val="2925144874"/>
+        <p14:creationId xmlns="" xmlns:p14="http://schemas.microsoft.com/office/powerpoint/2010/main" val="2925144874"/>
       </p:ext>
     </p:extLst>
   </p:cSld>
@@ -8647,7 +8748,7 @@
     </p:spTree>
     <p:extLst>
       <p:ext uri="{BB962C8B-B14F-4D97-AF65-F5344CB8AC3E}">
-        <p14:creationId xmlns:p14="http://schemas.microsoft.com/office/powerpoint/2010/main" xmlns="" val="2925144874"/>
+        <p14:creationId xmlns="" xmlns:p14="http://schemas.microsoft.com/office/powerpoint/2010/main" val="2925144874"/>
       </p:ext>
     </p:extLst>
   </p:cSld>
@@ -8891,7 +8992,7 @@
     </p:spTree>
     <p:extLst>
       <p:ext uri="{BB962C8B-B14F-4D97-AF65-F5344CB8AC3E}">
-        <p14:creationId xmlns:p14="http://schemas.microsoft.com/office/powerpoint/2010/main" xmlns="" val="2925144874"/>
+        <p14:creationId xmlns="" xmlns:p14="http://schemas.microsoft.com/office/powerpoint/2010/main" val="2925144874"/>
       </p:ext>
     </p:extLst>
   </p:cSld>
@@ -9127,7 +9228,7 @@
     </p:spTree>
     <p:extLst>
       <p:ext uri="{BB962C8B-B14F-4D97-AF65-F5344CB8AC3E}">
-        <p14:creationId xmlns:p14="http://schemas.microsoft.com/office/powerpoint/2010/main" xmlns="" val="2925144874"/>
+        <p14:creationId xmlns="" xmlns:p14="http://schemas.microsoft.com/office/powerpoint/2010/main" val="2925144874"/>
       </p:ext>
     </p:extLst>
   </p:cSld>
@@ -9274,7 +9375,7 @@
     </p:spTree>
     <p:extLst>
       <p:ext uri="{BB962C8B-B14F-4D97-AF65-F5344CB8AC3E}">
-        <p14:creationId xmlns:p14="http://schemas.microsoft.com/office/powerpoint/2010/main" xmlns="" val="2925144874"/>
+        <p14:creationId xmlns="" xmlns:p14="http://schemas.microsoft.com/office/powerpoint/2010/main" val="2925144874"/>
       </p:ext>
     </p:extLst>
   </p:cSld>
@@ -9364,12 +9465,32 @@
           </a:p>
           <a:p>
             <a:pPr marL="800100" lvl="1" indent="-342900">
-              <a:buFont typeface="+mj-lt"/>
-              <a:buAutoNum type="arabicPeriod"/>
-            </a:pPr>
-            <a:r>
-              <a:rPr lang="en-US" dirty="0" smtClean="0"/>
-              <a:t>The project should contain “My Computer” and “Simulation Target” (more on Simulation Target in a later section).</a:t>
+              <a:buFont typeface="Arial" pitchFamily="34" charset="0"/>
+              <a:buChar char="•"/>
+            </a:pPr>
+            <a:r>
+              <a:rPr lang="en-US" dirty="0" smtClean="0"/>
+              <a:t>The project should </a:t>
+            </a:r>
+            <a:r>
+              <a:rPr lang="en-US" dirty="0" smtClean="0"/>
+              <a:t>already contain </a:t>
+            </a:r>
+            <a:r>
+              <a:rPr lang="en-US" b="1" dirty="0" smtClean="0"/>
+              <a:t>My Computer </a:t>
+            </a:r>
+            <a:r>
+              <a:rPr lang="en-US" dirty="0" smtClean="0"/>
+              <a:t>and </a:t>
+            </a:r>
+            <a:r>
+              <a:rPr lang="en-US" b="1" dirty="0" smtClean="0"/>
+              <a:t>Simulation Target </a:t>
+            </a:r>
+            <a:r>
+              <a:rPr lang="en-US" dirty="0" smtClean="0"/>
+              <a:t>(more on Simulation Target in a later section).</a:t>
             </a:r>
           </a:p>
           <a:p>
@@ -9696,7 +9817,7 @@
     </p:spTree>
     <p:extLst>
       <p:ext uri="{BB962C8B-B14F-4D97-AF65-F5344CB8AC3E}">
-        <p14:creationId xmlns:p14="http://schemas.microsoft.com/office/powerpoint/2010/main" xmlns="" val="2925144874"/>
+        <p14:creationId xmlns="" xmlns:p14="http://schemas.microsoft.com/office/powerpoint/2010/main" val="2925144874"/>
       </p:ext>
     </p:extLst>
   </p:cSld>
@@ -10020,7 +10141,7 @@
     </p:spTree>
     <p:extLst>
       <p:ext uri="{BB962C8B-B14F-4D97-AF65-F5344CB8AC3E}">
-        <p14:creationId xmlns:p14="http://schemas.microsoft.com/office/powerpoint/2010/main" xmlns="" val="2925144874"/>
+        <p14:creationId xmlns="" xmlns:p14="http://schemas.microsoft.com/office/powerpoint/2010/main" val="2925144874"/>
       </p:ext>
     </p:extLst>
   </p:cSld>
@@ -10340,7 +10461,7 @@
     </p:spTree>
     <p:extLst>
       <p:ext uri="{BB962C8B-B14F-4D97-AF65-F5344CB8AC3E}">
-        <p14:creationId xmlns:p14="http://schemas.microsoft.com/office/powerpoint/2010/main" xmlns="" val="2925144874"/>
+        <p14:creationId xmlns="" xmlns:p14="http://schemas.microsoft.com/office/powerpoint/2010/main" val="2925144874"/>
       </p:ext>
     </p:extLst>
   </p:cSld>
@@ -10612,7 +10733,7 @@
   <a:extraClrSchemeLst/>
   <a:extLst>
     <a:ext uri="{05A4C25C-085E-4340-85A3-A5531E510DB2}">
-      <thm15:themeFamily xmlns:thm15="http://schemas.microsoft.com/office/thememl/2012/main" xmlns="" name="Office Theme" id="{62F939B6-93AF-4DB8-9C6B-D6C7DFDC589F}" vid="{4A3C46E8-61CC-4603-A589-7422A47A8E4A}"/>
+      <thm15:themeFamily xmlns="" xmlns:thm15="http://schemas.microsoft.com/office/thememl/2012/main" name="Office Theme" id="{62F939B6-93AF-4DB8-9C6B-D6C7DFDC589F}" vid="{4A3C46E8-61CC-4603-A589-7422A47A8E4A}"/>
     </a:ext>
   </a:extLst>
 </a:theme>

</xml_diff>